<commit_message>
analysis update 23 Apr
</commit_message>
<xml_diff>
--- a/outputs/flight_composition_fig/waterbird_composition_figure.pptx
+++ b/outputs/flight_composition_fig/waterbird_composition_figure.pptx
@@ -5,7 +5,8 @@
     <p:sldMasterId id="2147483648" r:id="rId1"/>
   </p:sldMasterIdLst>
   <p:sldIdLst>
-    <p:sldId id="256" r:id="rId2"/>
+    <p:sldId id="258" r:id="rId2"/>
+    <p:sldId id="256" r:id="rId3"/>
   </p:sldIdLst>
   <p:sldSz cx="12192000" cy="6858000"/>
   <p:notesSz cx="6858000" cy="9144000"/>
@@ -259,7 +260,7 @@
           <a:p>
             <a:fld id="{D27076BD-5DDE-834E-8842-D0C287015895}" type="datetimeFigureOut">
               <a:rPr lang="en-US" smtClean="0"/>
-              <a:t>1/17/24</a:t>
+              <a:t>2/26/25</a:t>
             </a:fld>
             <a:endParaRPr lang="en-US"/>
           </a:p>
@@ -457,7 +458,7 @@
           <a:p>
             <a:fld id="{D27076BD-5DDE-834E-8842-D0C287015895}" type="datetimeFigureOut">
               <a:rPr lang="en-US" smtClean="0"/>
-              <a:t>1/17/24</a:t>
+              <a:t>2/26/25</a:t>
             </a:fld>
             <a:endParaRPr lang="en-US"/>
           </a:p>
@@ -665,7 +666,7 @@
           <a:p>
             <a:fld id="{D27076BD-5DDE-834E-8842-D0C287015895}" type="datetimeFigureOut">
               <a:rPr lang="en-US" smtClean="0"/>
-              <a:t>1/17/24</a:t>
+              <a:t>2/26/25</a:t>
             </a:fld>
             <a:endParaRPr lang="en-US"/>
           </a:p>
@@ -863,7 +864,7 @@
           <a:p>
             <a:fld id="{D27076BD-5DDE-834E-8842-D0C287015895}" type="datetimeFigureOut">
               <a:rPr lang="en-US" smtClean="0"/>
-              <a:t>1/17/24</a:t>
+              <a:t>2/26/25</a:t>
             </a:fld>
             <a:endParaRPr lang="en-US"/>
           </a:p>
@@ -1138,7 +1139,7 @@
           <a:p>
             <a:fld id="{D27076BD-5DDE-834E-8842-D0C287015895}" type="datetimeFigureOut">
               <a:rPr lang="en-US" smtClean="0"/>
-              <a:t>1/17/24</a:t>
+              <a:t>2/26/25</a:t>
             </a:fld>
             <a:endParaRPr lang="en-US"/>
           </a:p>
@@ -1403,7 +1404,7 @@
           <a:p>
             <a:fld id="{D27076BD-5DDE-834E-8842-D0C287015895}" type="datetimeFigureOut">
               <a:rPr lang="en-US" smtClean="0"/>
-              <a:t>1/17/24</a:t>
+              <a:t>2/26/25</a:t>
             </a:fld>
             <a:endParaRPr lang="en-US"/>
           </a:p>
@@ -1815,7 +1816,7 @@
           <a:p>
             <a:fld id="{D27076BD-5DDE-834E-8842-D0C287015895}" type="datetimeFigureOut">
               <a:rPr lang="en-US" smtClean="0"/>
-              <a:t>1/17/24</a:t>
+              <a:t>2/26/25</a:t>
             </a:fld>
             <a:endParaRPr lang="en-US"/>
           </a:p>
@@ -1956,7 +1957,7 @@
           <a:p>
             <a:fld id="{D27076BD-5DDE-834E-8842-D0C287015895}" type="datetimeFigureOut">
               <a:rPr lang="en-US" smtClean="0"/>
-              <a:t>1/17/24</a:t>
+              <a:t>2/26/25</a:t>
             </a:fld>
             <a:endParaRPr lang="en-US"/>
           </a:p>
@@ -2069,7 +2070,7 @@
           <a:p>
             <a:fld id="{D27076BD-5DDE-834E-8842-D0C287015895}" type="datetimeFigureOut">
               <a:rPr lang="en-US" smtClean="0"/>
-              <a:t>1/17/24</a:t>
+              <a:t>2/26/25</a:t>
             </a:fld>
             <a:endParaRPr lang="en-US"/>
           </a:p>
@@ -2380,7 +2381,7 @@
           <a:p>
             <a:fld id="{D27076BD-5DDE-834E-8842-D0C287015895}" type="datetimeFigureOut">
               <a:rPr lang="en-US" smtClean="0"/>
-              <a:t>1/17/24</a:t>
+              <a:t>2/26/25</a:t>
             </a:fld>
             <a:endParaRPr lang="en-US"/>
           </a:p>
@@ -2668,7 +2669,7 @@
           <a:p>
             <a:fld id="{D27076BD-5DDE-834E-8842-D0C287015895}" type="datetimeFigureOut">
               <a:rPr lang="en-US" smtClean="0"/>
-              <a:t>1/17/24</a:t>
+              <a:t>2/26/25</a:t>
             </a:fld>
             <a:endParaRPr lang="en-US"/>
           </a:p>
@@ -2909,7 +2910,7 @@
           <a:p>
             <a:fld id="{D27076BD-5DDE-834E-8842-D0C287015895}" type="datetimeFigureOut">
               <a:rPr lang="en-US" smtClean="0"/>
-              <a:t>1/17/24</a:t>
+              <a:t>2/26/25</a:t>
             </a:fld>
             <a:endParaRPr lang="en-US"/>
           </a:p>
@@ -3314,6 +3315,513 @@
   <p:cSld>
     <p:spTree>
       <p:nvGrpSpPr>
+        <p:cNvPr id="1" name="">
+          <a:extLst>
+            <a:ext uri="{FF2B5EF4-FFF2-40B4-BE49-F238E27FC236}">
+              <a16:creationId xmlns:a16="http://schemas.microsoft.com/office/drawing/2014/main" id="{E6288919-360C-794D-BCA7-5BF0951B356F}"/>
+            </a:ext>
+          </a:extLst>
+        </p:cNvPr>
+        <p:cNvGrpSpPr/>
+        <p:nvPr/>
+      </p:nvGrpSpPr>
+      <p:grpSpPr>
+        <a:xfrm>
+          <a:off x="0" y="0"/>
+          <a:ext cx="0" cy="0"/>
+          <a:chOff x="0" y="0"/>
+          <a:chExt cx="0" cy="0"/>
+        </a:xfrm>
+      </p:grpSpPr>
+      <p:pic>
+        <p:nvPicPr>
+          <p:cNvPr id="5" name="Picture 4">
+            <a:extLst>
+              <a:ext uri="{FF2B5EF4-FFF2-40B4-BE49-F238E27FC236}">
+                <a16:creationId xmlns:a16="http://schemas.microsoft.com/office/drawing/2014/main" id="{3001C581-C149-E3BB-3A45-F485578CA1F0}"/>
+              </a:ext>
+            </a:extLst>
+          </p:cNvPr>
+          <p:cNvPicPr>
+            <a:picLocks noChangeAspect="1"/>
+          </p:cNvPicPr>
+          <p:nvPr/>
+        </p:nvPicPr>
+        <p:blipFill>
+          <a:blip r:embed="rId2"/>
+          <a:srcRect/>
+          <a:stretch/>
+        </p:blipFill>
+        <p:spPr>
+          <a:xfrm>
+            <a:off x="1109683" y="0"/>
+            <a:ext cx="9972632" cy="6856184"/>
+          </a:xfrm>
+          <a:prstGeom prst="rect">
+            <a:avLst/>
+          </a:prstGeom>
+        </p:spPr>
+      </p:pic>
+      <p:pic>
+        <p:nvPicPr>
+          <p:cNvPr id="7" name="Picture 6" descr="A black background with a black square&#10;&#10;Description automatically generated with medium confidence">
+            <a:extLst>
+              <a:ext uri="{FF2B5EF4-FFF2-40B4-BE49-F238E27FC236}">
+                <a16:creationId xmlns:a16="http://schemas.microsoft.com/office/drawing/2014/main" id="{50F7B0CF-6C3F-125F-A745-E0640FB7036F}"/>
+              </a:ext>
+            </a:extLst>
+          </p:cNvPr>
+          <p:cNvPicPr>
+            <a:picLocks noChangeAspect="1"/>
+          </p:cNvPicPr>
+          <p:nvPr/>
+        </p:nvPicPr>
+        <p:blipFill>
+          <a:blip r:embed="rId3"/>
+          <a:stretch>
+            <a:fillRect/>
+          </a:stretch>
+        </p:blipFill>
+        <p:spPr>
+          <a:xfrm flipH="1">
+            <a:off x="2795476" y="666879"/>
+            <a:ext cx="840595" cy="959252"/>
+          </a:xfrm>
+          <a:prstGeom prst="rect">
+            <a:avLst/>
+          </a:prstGeom>
+        </p:spPr>
+      </p:pic>
+      <p:pic>
+        <p:nvPicPr>
+          <p:cNvPr id="9" name="Picture 8" descr="A black background with a black square&#10;&#10;Description automatically generated with medium confidence">
+            <a:extLst>
+              <a:ext uri="{FF2B5EF4-FFF2-40B4-BE49-F238E27FC236}">
+                <a16:creationId xmlns:a16="http://schemas.microsoft.com/office/drawing/2014/main" id="{3FEB0F0F-6ED6-526D-AF0A-F4A47D290D92}"/>
+              </a:ext>
+            </a:extLst>
+          </p:cNvPr>
+          <p:cNvPicPr>
+            <a:picLocks noChangeAspect="1"/>
+          </p:cNvPicPr>
+          <p:nvPr/>
+        </p:nvPicPr>
+        <p:blipFill>
+          <a:blip r:embed="rId4"/>
+          <a:stretch>
+            <a:fillRect/>
+          </a:stretch>
+        </p:blipFill>
+        <p:spPr>
+          <a:xfrm flipH="1">
+            <a:off x="3822692" y="2623204"/>
+            <a:ext cx="833748" cy="484143"/>
+          </a:xfrm>
+          <a:prstGeom prst="rect">
+            <a:avLst/>
+          </a:prstGeom>
+        </p:spPr>
+      </p:pic>
+      <p:pic>
+        <p:nvPicPr>
+          <p:cNvPr id="11" name="Picture 10" descr="A black background with a black square&#10;&#10;Description automatically generated with medium confidence">
+            <a:extLst>
+              <a:ext uri="{FF2B5EF4-FFF2-40B4-BE49-F238E27FC236}">
+                <a16:creationId xmlns:a16="http://schemas.microsoft.com/office/drawing/2014/main" id="{B26B0879-7FCD-EFD5-5DFF-E924CB66BDBF}"/>
+              </a:ext>
+            </a:extLst>
+          </p:cNvPr>
+          <p:cNvPicPr>
+            <a:picLocks noChangeAspect="1"/>
+          </p:cNvPicPr>
+          <p:nvPr/>
+        </p:nvPicPr>
+        <p:blipFill>
+          <a:blip r:embed="rId5"/>
+          <a:stretch>
+            <a:fillRect/>
+          </a:stretch>
+        </p:blipFill>
+        <p:spPr>
+          <a:xfrm>
+            <a:off x="4731360" y="2865276"/>
+            <a:ext cx="865599" cy="702173"/>
+          </a:xfrm>
+          <a:prstGeom prst="rect">
+            <a:avLst/>
+          </a:prstGeom>
+        </p:spPr>
+      </p:pic>
+      <p:pic>
+        <p:nvPicPr>
+          <p:cNvPr id="15" name="Picture 14" descr="A black background with a black square&#10;&#10;Description automatically generated with medium confidence">
+            <a:extLst>
+              <a:ext uri="{FF2B5EF4-FFF2-40B4-BE49-F238E27FC236}">
+                <a16:creationId xmlns:a16="http://schemas.microsoft.com/office/drawing/2014/main" id="{5AB82515-63AC-EA75-8945-A440AD189521}"/>
+              </a:ext>
+            </a:extLst>
+          </p:cNvPr>
+          <p:cNvPicPr>
+            <a:picLocks noChangeAspect="1"/>
+          </p:cNvPicPr>
+          <p:nvPr/>
+        </p:nvPicPr>
+        <p:blipFill>
+          <a:blip r:embed="rId6"/>
+          <a:stretch>
+            <a:fillRect/>
+          </a:stretch>
+        </p:blipFill>
+        <p:spPr>
+          <a:xfrm flipH="1">
+            <a:off x="5580131" y="3601390"/>
+            <a:ext cx="1223345" cy="837864"/>
+          </a:xfrm>
+          <a:prstGeom prst="rect">
+            <a:avLst/>
+          </a:prstGeom>
+        </p:spPr>
+      </p:pic>
+      <p:pic>
+        <p:nvPicPr>
+          <p:cNvPr id="17" name="Picture 16" descr="A black background with a black square&#10;&#10;Description automatically generated with medium confidence">
+            <a:extLst>
+              <a:ext uri="{FF2B5EF4-FFF2-40B4-BE49-F238E27FC236}">
+                <a16:creationId xmlns:a16="http://schemas.microsoft.com/office/drawing/2014/main" id="{E10A8B4E-AE28-B23F-CBA6-314837C78489}"/>
+              </a:ext>
+            </a:extLst>
+          </p:cNvPr>
+          <p:cNvPicPr>
+            <a:picLocks noChangeAspect="1"/>
+          </p:cNvPicPr>
+          <p:nvPr/>
+        </p:nvPicPr>
+        <p:blipFill>
+          <a:blip r:embed="rId7"/>
+          <a:stretch>
+            <a:fillRect/>
+          </a:stretch>
+        </p:blipFill>
+        <p:spPr>
+          <a:xfrm flipH="1">
+            <a:off x="8864409" y="3873386"/>
+            <a:ext cx="956137" cy="837864"/>
+          </a:xfrm>
+          <a:prstGeom prst="rect">
+            <a:avLst/>
+          </a:prstGeom>
+        </p:spPr>
+      </p:pic>
+      <p:pic>
+        <p:nvPicPr>
+          <p:cNvPr id="19" name="Picture 18" descr="A black background with a black square&#10;&#10;Description automatically generated with medium confidence">
+            <a:extLst>
+              <a:ext uri="{FF2B5EF4-FFF2-40B4-BE49-F238E27FC236}">
+                <a16:creationId xmlns:a16="http://schemas.microsoft.com/office/drawing/2014/main" id="{2E189472-D73A-7FC5-AB12-1D3FFA801C51}"/>
+              </a:ext>
+            </a:extLst>
+          </p:cNvPr>
+          <p:cNvPicPr>
+            <a:picLocks noChangeAspect="1"/>
+          </p:cNvPicPr>
+          <p:nvPr/>
+        </p:nvPicPr>
+        <p:blipFill>
+          <a:blip r:embed="rId8"/>
+          <a:stretch>
+            <a:fillRect/>
+          </a:stretch>
+        </p:blipFill>
+        <p:spPr>
+          <a:xfrm>
+            <a:off x="7783839" y="4458044"/>
+            <a:ext cx="1289576" cy="399634"/>
+          </a:xfrm>
+          <a:prstGeom prst="rect">
+            <a:avLst/>
+          </a:prstGeom>
+        </p:spPr>
+      </p:pic>
+      <p:pic>
+        <p:nvPicPr>
+          <p:cNvPr id="21" name="Picture 20">
+            <a:extLst>
+              <a:ext uri="{FF2B5EF4-FFF2-40B4-BE49-F238E27FC236}">
+                <a16:creationId xmlns:a16="http://schemas.microsoft.com/office/drawing/2014/main" id="{56C8825E-2D74-6BEE-C4E2-48762D58ABFD}"/>
+              </a:ext>
+            </a:extLst>
+          </p:cNvPr>
+          <p:cNvPicPr>
+            <a:picLocks noChangeAspect="1"/>
+          </p:cNvPicPr>
+          <p:nvPr/>
+        </p:nvPicPr>
+        <p:blipFill>
+          <a:blip r:embed="rId9"/>
+          <a:stretch>
+            <a:fillRect/>
+          </a:stretch>
+        </p:blipFill>
+        <p:spPr>
+          <a:xfrm>
+            <a:off x="9873405" y="3848408"/>
+            <a:ext cx="996580" cy="1290215"/>
+          </a:xfrm>
+          <a:prstGeom prst="rect">
+            <a:avLst/>
+          </a:prstGeom>
+        </p:spPr>
+      </p:pic>
+      <p:pic>
+        <p:nvPicPr>
+          <p:cNvPr id="3" name="Picture 2" descr="A black background with a black square&#10;&#10;Description automatically generated with medium confidence">
+            <a:extLst>
+              <a:ext uri="{FF2B5EF4-FFF2-40B4-BE49-F238E27FC236}">
+                <a16:creationId xmlns:a16="http://schemas.microsoft.com/office/drawing/2014/main" id="{64C940F3-0CE1-1D51-481E-599DF0FBE5C4}"/>
+              </a:ext>
+            </a:extLst>
+          </p:cNvPr>
+          <p:cNvPicPr>
+            <a:picLocks noChangeAspect="1"/>
+          </p:cNvPicPr>
+          <p:nvPr/>
+        </p:nvPicPr>
+        <p:blipFill>
+          <a:blip r:embed="rId10"/>
+          <a:stretch>
+            <a:fillRect/>
+          </a:stretch>
+        </p:blipFill>
+        <p:spPr>
+          <a:xfrm>
+            <a:off x="6932637" y="3971806"/>
+            <a:ext cx="782779" cy="641024"/>
+          </a:xfrm>
+          <a:prstGeom prst="rect">
+            <a:avLst/>
+          </a:prstGeom>
+        </p:spPr>
+      </p:pic>
+      <p:sp>
+        <p:nvSpPr>
+          <p:cNvPr id="4" name="TextBox 3">
+            <a:extLst>
+              <a:ext uri="{FF2B5EF4-FFF2-40B4-BE49-F238E27FC236}">
+                <a16:creationId xmlns:a16="http://schemas.microsoft.com/office/drawing/2014/main" id="{E2F4DABE-50D3-D447-2D73-9543FA4C9512}"/>
+              </a:ext>
+            </a:extLst>
+          </p:cNvPr>
+          <p:cNvSpPr txBox="1"/>
+          <p:nvPr/>
+        </p:nvSpPr>
+        <p:spPr>
+          <a:xfrm>
+            <a:off x="3914442" y="3416724"/>
+            <a:ext cx="650249" cy="369332"/>
+          </a:xfrm>
+          <a:prstGeom prst="rect">
+            <a:avLst/>
+          </a:prstGeom>
+          <a:noFill/>
+        </p:spPr>
+        <p:txBody>
+          <a:bodyPr wrap="square" rtlCol="0">
+            <a:spAutoFit/>
+          </a:bodyPr>
+          <a:lstStyle/>
+          <a:p>
+            <a:r>
+              <a:rPr lang="en-US" b="1" dirty="0">
+                <a:solidFill>
+                  <a:schemeClr val="bg1"/>
+                </a:solidFill>
+                <a:latin typeface="Arial" panose="020B0604020202020204" pitchFamily="34" charset="0"/>
+                <a:cs typeface="Arial" panose="020B0604020202020204" pitchFamily="34" charset="0"/>
+              </a:rPr>
+              <a:t>21%</a:t>
+            </a:r>
+          </a:p>
+        </p:txBody>
+      </p:sp>
+      <p:sp>
+        <p:nvSpPr>
+          <p:cNvPr id="6" name="TextBox 5">
+            <a:extLst>
+              <a:ext uri="{FF2B5EF4-FFF2-40B4-BE49-F238E27FC236}">
+                <a16:creationId xmlns:a16="http://schemas.microsoft.com/office/drawing/2014/main" id="{0DE84617-9884-0C49-8D2E-78558E47F02A}"/>
+              </a:ext>
+            </a:extLst>
+          </p:cNvPr>
+          <p:cNvSpPr txBox="1"/>
+          <p:nvPr/>
+        </p:nvSpPr>
+        <p:spPr>
+          <a:xfrm>
+            <a:off x="4929882" y="3719250"/>
+            <a:ext cx="650249" cy="369332"/>
+          </a:xfrm>
+          <a:prstGeom prst="rect">
+            <a:avLst/>
+          </a:prstGeom>
+          <a:noFill/>
+        </p:spPr>
+        <p:txBody>
+          <a:bodyPr wrap="square" rtlCol="0">
+            <a:spAutoFit/>
+          </a:bodyPr>
+          <a:lstStyle/>
+          <a:p>
+            <a:r>
+              <a:rPr lang="en-US" b="1" dirty="0">
+                <a:solidFill>
+                  <a:schemeClr val="bg1"/>
+                </a:solidFill>
+                <a:latin typeface="Arial" panose="020B0604020202020204" pitchFamily="34" charset="0"/>
+                <a:cs typeface="Arial" panose="020B0604020202020204" pitchFamily="34" charset="0"/>
+              </a:rPr>
+              <a:t>18%</a:t>
+            </a:r>
+          </a:p>
+        </p:txBody>
+      </p:sp>
+      <p:sp>
+        <p:nvSpPr>
+          <p:cNvPr id="8" name="TextBox 7">
+            <a:extLst>
+              <a:ext uri="{FF2B5EF4-FFF2-40B4-BE49-F238E27FC236}">
+                <a16:creationId xmlns:a16="http://schemas.microsoft.com/office/drawing/2014/main" id="{A8224C43-E8FF-3659-4F1E-ACC18837E2E8}"/>
+              </a:ext>
+            </a:extLst>
+          </p:cNvPr>
+          <p:cNvSpPr txBox="1"/>
+          <p:nvPr/>
+        </p:nvSpPr>
+        <p:spPr>
+          <a:xfrm>
+            <a:off x="6054285" y="4473195"/>
+            <a:ext cx="521493" cy="369332"/>
+          </a:xfrm>
+          <a:prstGeom prst="rect">
+            <a:avLst/>
+          </a:prstGeom>
+          <a:noFill/>
+        </p:spPr>
+        <p:txBody>
+          <a:bodyPr wrap="square" rtlCol="0">
+            <a:spAutoFit/>
+          </a:bodyPr>
+          <a:lstStyle/>
+          <a:p>
+            <a:r>
+              <a:rPr lang="en-US" b="1" dirty="0">
+                <a:solidFill>
+                  <a:schemeClr val="bg1"/>
+                </a:solidFill>
+                <a:latin typeface="Arial" panose="020B0604020202020204" pitchFamily="34" charset="0"/>
+                <a:cs typeface="Arial" panose="020B0604020202020204" pitchFamily="34" charset="0"/>
+              </a:rPr>
+              <a:t>9%</a:t>
+            </a:r>
+          </a:p>
+        </p:txBody>
+      </p:sp>
+      <p:sp>
+        <p:nvSpPr>
+          <p:cNvPr id="23" name="TextBox 22">
+            <a:extLst>
+              <a:ext uri="{FF2B5EF4-FFF2-40B4-BE49-F238E27FC236}">
+                <a16:creationId xmlns:a16="http://schemas.microsoft.com/office/drawing/2014/main" id="{F0FD1FB2-A666-FCDD-7284-A764897C6D26}"/>
+              </a:ext>
+            </a:extLst>
+          </p:cNvPr>
+          <p:cNvSpPr txBox="1"/>
+          <p:nvPr/>
+        </p:nvSpPr>
+        <p:spPr>
+          <a:xfrm>
+            <a:off x="2890648" y="1772182"/>
+            <a:ext cx="650249" cy="369332"/>
+          </a:xfrm>
+          <a:prstGeom prst="rect">
+            <a:avLst/>
+          </a:prstGeom>
+          <a:noFill/>
+        </p:spPr>
+        <p:txBody>
+          <a:bodyPr wrap="square" rtlCol="0">
+            <a:spAutoFit/>
+          </a:bodyPr>
+          <a:lstStyle/>
+          <a:p>
+            <a:r>
+              <a:rPr lang="en-US" b="1" dirty="0">
+                <a:latin typeface="Arial" panose="020B0604020202020204" pitchFamily="34" charset="0"/>
+                <a:cs typeface="Arial" panose="020B0604020202020204" pitchFamily="34" charset="0"/>
+              </a:rPr>
+              <a:t>39%</a:t>
+            </a:r>
+          </a:p>
+        </p:txBody>
+      </p:sp>
+      <p:sp>
+        <p:nvSpPr>
+          <p:cNvPr id="24" name="TextBox 23">
+            <a:extLst>
+              <a:ext uri="{FF2B5EF4-FFF2-40B4-BE49-F238E27FC236}">
+                <a16:creationId xmlns:a16="http://schemas.microsoft.com/office/drawing/2014/main" id="{DBB9FD91-E826-3A98-F041-7A1FAD83627B}"/>
+              </a:ext>
+            </a:extLst>
+          </p:cNvPr>
+          <p:cNvSpPr txBox="1"/>
+          <p:nvPr/>
+        </p:nvSpPr>
+        <p:spPr>
+          <a:xfrm>
+            <a:off x="7036708" y="4696324"/>
+            <a:ext cx="521493" cy="369332"/>
+          </a:xfrm>
+          <a:prstGeom prst="rect">
+            <a:avLst/>
+          </a:prstGeom>
+          <a:noFill/>
+        </p:spPr>
+        <p:txBody>
+          <a:bodyPr wrap="square" rtlCol="0">
+            <a:spAutoFit/>
+          </a:bodyPr>
+          <a:lstStyle/>
+          <a:p>
+            <a:r>
+              <a:rPr lang="en-US" b="1" dirty="0">
+                <a:solidFill>
+                  <a:schemeClr val="bg1"/>
+                </a:solidFill>
+                <a:latin typeface="Arial" panose="020B0604020202020204" pitchFamily="34" charset="0"/>
+                <a:cs typeface="Arial" panose="020B0604020202020204" pitchFamily="34" charset="0"/>
+              </a:rPr>
+              <a:t>6%</a:t>
+            </a:r>
+          </a:p>
+        </p:txBody>
+      </p:sp>
+    </p:spTree>
+    <p:extLst>
+      <p:ext uri="{BB962C8B-B14F-4D97-AF65-F5344CB8AC3E}">
+        <p14:creationId xmlns:p14="http://schemas.microsoft.com/office/powerpoint/2010/main" val="187320677"/>
+      </p:ext>
+    </p:extLst>
+  </p:cSld>
+  <p:clrMapOvr>
+    <a:masterClrMapping/>
+  </p:clrMapOvr>
+</p:sld>
+</file>
+
+<file path=ppt/slides/slide2.xml><?xml version="1.0" encoding="utf-8"?>
+<p:sld xmlns:a="http://schemas.openxmlformats.org/drawingml/2006/main" xmlns:r="http://schemas.openxmlformats.org/officeDocument/2006/relationships" xmlns:p="http://schemas.openxmlformats.org/presentationml/2006/main">
+  <p:cSld>
+    <p:spTree>
+      <p:nvGrpSpPr>
         <p:cNvPr id="1" name=""/>
         <p:cNvGrpSpPr/>
         <p:nvPr/>
@@ -3797,36 +4305,6 @@
           </a:p>
         </p:txBody>
       </p:sp>
-      <p:pic>
-        <p:nvPicPr>
-          <p:cNvPr id="10" name="Picture 9" descr="A logo for a school&#10;&#10;Description automatically generated">
-            <a:extLst>
-              <a:ext uri="{FF2B5EF4-FFF2-40B4-BE49-F238E27FC236}">
-                <a16:creationId xmlns:a16="http://schemas.microsoft.com/office/drawing/2014/main" id="{B2004907-3E47-A410-E0EE-23800037707E}"/>
-              </a:ext>
-            </a:extLst>
-          </p:cNvPr>
-          <p:cNvPicPr>
-            <a:picLocks noChangeAspect="1"/>
-          </p:cNvPicPr>
-          <p:nvPr/>
-        </p:nvPicPr>
-        <p:blipFill>
-          <a:blip r:embed="rId11"/>
-          <a:stretch>
-            <a:fillRect/>
-          </a:stretch>
-        </p:blipFill>
-        <p:spPr>
-          <a:xfrm>
-            <a:off x="9492035" y="207446"/>
-            <a:ext cx="1377950" cy="1339850"/>
-          </a:xfrm>
-          <a:prstGeom prst="rect">
-            <a:avLst/>
-          </a:prstGeom>
-        </p:spPr>
-      </p:pic>
     </p:spTree>
     <p:extLst>
       <p:ext uri="{BB962C8B-B14F-4D97-AF65-F5344CB8AC3E}">

</xml_diff>